<commit_message>
Update Modeling R2 score tables.pptx
</commit_message>
<xml_diff>
--- a/pgpractice/Machine Learning Practice/Regression/Modeling R2 score tables.pptx
+++ b/pgpractice/Machine Learning Practice/Regression/Modeling R2 score tables.pptx
@@ -112,6 +112,11 @@
       </a:defRPr>
     </a:lvl9pPr>
   </p:defaultTextStyle>
+  <p:extLst>
+    <p:ext uri="{EFAFB233-063F-42B5-8137-9DF3F51BA10A}">
+      <p15:sldGuideLst xmlns:p15="http://schemas.microsoft.com/office/powerpoint/2012/main"/>
+    </p:ext>
+  </p:extLst>
 </p:presentation>
 </file>
 
@@ -262,7 +267,7 @@
           <a:p>
             <a:fld id="{4FFB04BF-FAFA-4813-B009-44CE47C15413}" type="datetimeFigureOut">
               <a:rPr lang="ko-KR" altLang="en-US" smtClean="0"/>
-              <a:t>2024-03-31</a:t>
+              <a:t>2024-04-01</a:t>
             </a:fld>
             <a:endParaRPr lang="ko-KR" altLang="en-US"/>
           </a:p>
@@ -460,7 +465,7 @@
           <a:p>
             <a:fld id="{4FFB04BF-FAFA-4813-B009-44CE47C15413}" type="datetimeFigureOut">
               <a:rPr lang="ko-KR" altLang="en-US" smtClean="0"/>
-              <a:t>2024-03-31</a:t>
+              <a:t>2024-04-01</a:t>
             </a:fld>
             <a:endParaRPr lang="ko-KR" altLang="en-US"/>
           </a:p>
@@ -668,7 +673,7 @@
           <a:p>
             <a:fld id="{4FFB04BF-FAFA-4813-B009-44CE47C15413}" type="datetimeFigureOut">
               <a:rPr lang="ko-KR" altLang="en-US" smtClean="0"/>
-              <a:t>2024-03-31</a:t>
+              <a:t>2024-04-01</a:t>
             </a:fld>
             <a:endParaRPr lang="ko-KR" altLang="en-US"/>
           </a:p>
@@ -866,7 +871,7 @@
           <a:p>
             <a:fld id="{4FFB04BF-FAFA-4813-B009-44CE47C15413}" type="datetimeFigureOut">
               <a:rPr lang="ko-KR" altLang="en-US" smtClean="0"/>
-              <a:t>2024-03-31</a:t>
+              <a:t>2024-04-01</a:t>
             </a:fld>
             <a:endParaRPr lang="ko-KR" altLang="en-US"/>
           </a:p>
@@ -1141,7 +1146,7 @@
           <a:p>
             <a:fld id="{4FFB04BF-FAFA-4813-B009-44CE47C15413}" type="datetimeFigureOut">
               <a:rPr lang="ko-KR" altLang="en-US" smtClean="0"/>
-              <a:t>2024-03-31</a:t>
+              <a:t>2024-04-01</a:t>
             </a:fld>
             <a:endParaRPr lang="ko-KR" altLang="en-US"/>
           </a:p>
@@ -1406,7 +1411,7 @@
           <a:p>
             <a:fld id="{4FFB04BF-FAFA-4813-B009-44CE47C15413}" type="datetimeFigureOut">
               <a:rPr lang="ko-KR" altLang="en-US" smtClean="0"/>
-              <a:t>2024-03-31</a:t>
+              <a:t>2024-04-01</a:t>
             </a:fld>
             <a:endParaRPr lang="ko-KR" altLang="en-US"/>
           </a:p>
@@ -1818,7 +1823,7 @@
           <a:p>
             <a:fld id="{4FFB04BF-FAFA-4813-B009-44CE47C15413}" type="datetimeFigureOut">
               <a:rPr lang="ko-KR" altLang="en-US" smtClean="0"/>
-              <a:t>2024-03-31</a:t>
+              <a:t>2024-04-01</a:t>
             </a:fld>
             <a:endParaRPr lang="ko-KR" altLang="en-US"/>
           </a:p>
@@ -1959,7 +1964,7 @@
           <a:p>
             <a:fld id="{4FFB04BF-FAFA-4813-B009-44CE47C15413}" type="datetimeFigureOut">
               <a:rPr lang="ko-KR" altLang="en-US" smtClean="0"/>
-              <a:t>2024-03-31</a:t>
+              <a:t>2024-04-01</a:t>
             </a:fld>
             <a:endParaRPr lang="ko-KR" altLang="en-US"/>
           </a:p>
@@ -2072,7 +2077,7 @@
           <a:p>
             <a:fld id="{4FFB04BF-FAFA-4813-B009-44CE47C15413}" type="datetimeFigureOut">
               <a:rPr lang="ko-KR" altLang="en-US" smtClean="0"/>
-              <a:t>2024-03-31</a:t>
+              <a:t>2024-04-01</a:t>
             </a:fld>
             <a:endParaRPr lang="ko-KR" altLang="en-US"/>
           </a:p>
@@ -2383,7 +2388,7 @@
           <a:p>
             <a:fld id="{4FFB04BF-FAFA-4813-B009-44CE47C15413}" type="datetimeFigureOut">
               <a:rPr lang="ko-KR" altLang="en-US" smtClean="0"/>
-              <a:t>2024-03-31</a:t>
+              <a:t>2024-04-01</a:t>
             </a:fld>
             <a:endParaRPr lang="ko-KR" altLang="en-US"/>
           </a:p>
@@ -2671,7 +2676,7 @@
           <a:p>
             <a:fld id="{4FFB04BF-FAFA-4813-B009-44CE47C15413}" type="datetimeFigureOut">
               <a:rPr lang="ko-KR" altLang="en-US" smtClean="0"/>
-              <a:t>2024-03-31</a:t>
+              <a:t>2024-04-01</a:t>
             </a:fld>
             <a:endParaRPr lang="ko-KR" altLang="en-US"/>
           </a:p>
@@ -2912,7 +2917,7 @@
           <a:p>
             <a:fld id="{4FFB04BF-FAFA-4813-B009-44CE47C15413}" type="datetimeFigureOut">
               <a:rPr lang="ko-KR" altLang="en-US" smtClean="0"/>
-              <a:t>2024-03-31</a:t>
+              <a:t>2024-04-01</a:t>
             </a:fld>
             <a:endParaRPr lang="ko-KR" altLang="en-US"/>
           </a:p>
@@ -30504,7 +30509,7 @@
           <p:nvPr>
             <p:extLst>
               <p:ext uri="{D42A27DB-BD31-4B8C-83A1-F6EECF244321}">
-                <p14:modId xmlns:p14="http://schemas.microsoft.com/office/powerpoint/2010/main" val="231263348"/>
+                <p14:modId xmlns:p14="http://schemas.microsoft.com/office/powerpoint/2010/main" val="2217831073"/>
               </p:ext>
             </p:extLst>
           </p:nvPr>
@@ -31103,7 +31108,7 @@
                             <a:sysClr val="windowText" lastClr="000000"/>
                           </a:solidFill>
                         </a:rPr>
-                        <a:t>179</a:t>
+                        <a:t>121</a:t>
                       </a:r>
                       <a:endParaRPr lang="ko-KR" altLang="en-US" sz="1600" dirty="0">
                         <a:solidFill>
@@ -31164,7 +31169,7 @@
                             <a:sysClr val="windowText" lastClr="000000"/>
                           </a:solidFill>
                         </a:rPr>
-                        <a:t>45</a:t>
+                        <a:t>31</a:t>
                       </a:r>
                       <a:endParaRPr lang="ko-KR" altLang="en-US" sz="1600" dirty="0">
                         <a:solidFill>
@@ -35038,7 +35043,7 @@
           <p:nvPr>
             <p:extLst>
               <p:ext uri="{D42A27DB-BD31-4B8C-83A1-F6EECF244321}">
-                <p14:modId xmlns:p14="http://schemas.microsoft.com/office/powerpoint/2010/main" val="2538423155"/>
+                <p14:modId xmlns:p14="http://schemas.microsoft.com/office/powerpoint/2010/main" val="3927791546"/>
               </p:ext>
             </p:extLst>
           </p:nvPr>
@@ -35637,7 +35642,7 @@
                             <a:sysClr val="windowText" lastClr="000000"/>
                           </a:solidFill>
                         </a:rPr>
-                        <a:t>179</a:t>
+                        <a:t>121</a:t>
                       </a:r>
                       <a:endParaRPr lang="ko-KR" altLang="en-US" sz="1600" dirty="0">
                         <a:solidFill>
@@ -35698,7 +35703,7 @@
                             <a:sysClr val="windowText" lastClr="000000"/>
                           </a:solidFill>
                         </a:rPr>
-                        <a:t>45</a:t>
+                        <a:t>31</a:t>
                       </a:r>
                       <a:endParaRPr lang="ko-KR" altLang="en-US" sz="1600" dirty="0">
                         <a:solidFill>

</xml_diff>